<commit_message>
Change the implentation for the Jump Game question
</commit_message>
<xml_diff>
--- a/数据结构&算法-8-贪心算法.pptx
+++ b/数据结构&算法-8-贪心算法.pptx
@@ -300,7 +300,7 @@
           <a:p>
             <a:fld id="{16381544-E555-424B-A8A4-641E4ACFE059}" type="datetimeFigureOut">
               <a:rPr lang="zh-CN" altLang="en-US" smtClean="0"/>
-              <a:t>2019/11/27</a:t>
+              <a:t>2023/9/21</a:t>
             </a:fld>
             <a:endParaRPr lang="zh-CN" altLang="en-US"/>
           </a:p>
@@ -612,7 +612,7 @@
           <a:p>
             <a:fld id="{16381544-E555-424B-A8A4-641E4ACFE059}" type="datetimeFigureOut">
               <a:rPr lang="zh-CN" altLang="en-US" smtClean="0"/>
-              <a:t>2019/11/27</a:t>
+              <a:t>2023/9/21</a:t>
             </a:fld>
             <a:endParaRPr lang="zh-CN" altLang="en-US"/>
           </a:p>
@@ -834,7 +834,7 @@
           <a:p>
             <a:fld id="{16381544-E555-424B-A8A4-641E4ACFE059}" type="datetimeFigureOut">
               <a:rPr lang="zh-CN" altLang="en-US" smtClean="0"/>
-              <a:t>2019/11/27</a:t>
+              <a:t>2023/9/21</a:t>
             </a:fld>
             <a:endParaRPr lang="zh-CN" altLang="en-US"/>
           </a:p>
@@ -1125,7 +1125,7 @@
           <a:p>
             <a:fld id="{16381544-E555-424B-A8A4-641E4ACFE059}" type="datetimeFigureOut">
               <a:rPr lang="zh-CN" altLang="en-US" smtClean="0"/>
-              <a:t>2019/11/27</a:t>
+              <a:t>2023/9/21</a:t>
             </a:fld>
             <a:endParaRPr lang="zh-CN" altLang="en-US"/>
           </a:p>
@@ -1579,7 +1579,7 @@
           <a:p>
             <a:fld id="{16381544-E555-424B-A8A4-641E4ACFE059}" type="datetimeFigureOut">
               <a:rPr lang="zh-CN" altLang="en-US" smtClean="0"/>
-              <a:t>2019/11/27</a:t>
+              <a:t>2023/9/21</a:t>
             </a:fld>
             <a:endParaRPr lang="zh-CN" altLang="en-US"/>
           </a:p>
@@ -2155,7 +2155,7 @@
           <a:p>
             <a:fld id="{16381544-E555-424B-A8A4-641E4ACFE059}" type="datetimeFigureOut">
               <a:rPr lang="zh-CN" altLang="en-US" smtClean="0"/>
-              <a:t>2019/11/27</a:t>
+              <a:t>2023/9/21</a:t>
             </a:fld>
             <a:endParaRPr lang="zh-CN" altLang="en-US"/>
           </a:p>
@@ -3007,7 +3007,7 @@
           <a:p>
             <a:fld id="{16381544-E555-424B-A8A4-641E4ACFE059}" type="datetimeFigureOut">
               <a:rPr lang="zh-CN" altLang="en-US" smtClean="0"/>
-              <a:t>2019/11/27</a:t>
+              <a:t>2023/9/21</a:t>
             </a:fld>
             <a:endParaRPr lang="zh-CN" altLang="en-US"/>
           </a:p>
@@ -3212,7 +3212,7 @@
           <a:p>
             <a:fld id="{16381544-E555-424B-A8A4-641E4ACFE059}" type="datetimeFigureOut">
               <a:rPr lang="zh-CN" altLang="en-US" smtClean="0"/>
-              <a:t>2019/11/27</a:t>
+              <a:t>2023/9/21</a:t>
             </a:fld>
             <a:endParaRPr lang="zh-CN" altLang="en-US"/>
           </a:p>
@@ -3426,7 +3426,7 @@
           <a:p>
             <a:fld id="{16381544-E555-424B-A8A4-641E4ACFE059}" type="datetimeFigureOut">
               <a:rPr lang="zh-CN" altLang="en-US" smtClean="0"/>
-              <a:t>2019/11/27</a:t>
+              <a:t>2023/9/21</a:t>
             </a:fld>
             <a:endParaRPr lang="zh-CN" altLang="en-US"/>
           </a:p>
@@ -3631,7 +3631,7 @@
           <a:p>
             <a:fld id="{16381544-E555-424B-A8A4-641E4ACFE059}" type="datetimeFigureOut">
               <a:rPr lang="zh-CN" altLang="en-US" smtClean="0"/>
-              <a:t>2019/11/27</a:t>
+              <a:t>2023/9/21</a:t>
             </a:fld>
             <a:endParaRPr lang="zh-CN" altLang="en-US"/>
           </a:p>
@@ -3911,7 +3911,7 @@
           <a:p>
             <a:fld id="{16381544-E555-424B-A8A4-641E4ACFE059}" type="datetimeFigureOut">
               <a:rPr lang="zh-CN" altLang="en-US" smtClean="0"/>
-              <a:t>2019/11/27</a:t>
+              <a:t>2023/9/21</a:t>
             </a:fld>
             <a:endParaRPr lang="zh-CN" altLang="en-US"/>
           </a:p>
@@ -4178,7 +4178,7 @@
           <a:p>
             <a:fld id="{16381544-E555-424B-A8A4-641E4ACFE059}" type="datetimeFigureOut">
               <a:rPr lang="zh-CN" altLang="en-US" smtClean="0"/>
-              <a:t>2019/11/27</a:t>
+              <a:t>2023/9/21</a:t>
             </a:fld>
             <a:endParaRPr lang="zh-CN" altLang="en-US"/>
           </a:p>
@@ -4593,7 +4593,7 @@
           <a:p>
             <a:fld id="{16381544-E555-424B-A8A4-641E4ACFE059}" type="datetimeFigureOut">
               <a:rPr lang="zh-CN" altLang="en-US" smtClean="0"/>
-              <a:t>2019/11/27</a:t>
+              <a:t>2023/9/21</a:t>
             </a:fld>
             <a:endParaRPr lang="zh-CN" altLang="en-US"/>
           </a:p>
@@ -4741,7 +4741,7 @@
           <a:p>
             <a:fld id="{16381544-E555-424B-A8A4-641E4ACFE059}" type="datetimeFigureOut">
               <a:rPr lang="zh-CN" altLang="en-US" smtClean="0"/>
-              <a:t>2019/11/27</a:t>
+              <a:t>2023/9/21</a:t>
             </a:fld>
             <a:endParaRPr lang="zh-CN" altLang="en-US"/>
           </a:p>
@@ -4866,7 +4866,7 @@
           <a:p>
             <a:fld id="{16381544-E555-424B-A8A4-641E4ACFE059}" type="datetimeFigureOut">
               <a:rPr lang="zh-CN" altLang="en-US" smtClean="0"/>
-              <a:t>2019/11/27</a:t>
+              <a:t>2023/9/21</a:t>
             </a:fld>
             <a:endParaRPr lang="zh-CN" altLang="en-US"/>
           </a:p>
@@ -5145,7 +5145,7 @@
           <a:p>
             <a:fld id="{16381544-E555-424B-A8A4-641E4ACFE059}" type="datetimeFigureOut">
               <a:rPr lang="zh-CN" altLang="en-US" smtClean="0"/>
-              <a:t>2019/11/27</a:t>
+              <a:t>2023/9/21</a:t>
             </a:fld>
             <a:endParaRPr lang="zh-CN" altLang="en-US"/>
           </a:p>
@@ -5457,7 +5457,7 @@
           <a:p>
             <a:fld id="{16381544-E555-424B-A8A4-641E4ACFE059}" type="datetimeFigureOut">
               <a:rPr lang="zh-CN" altLang="en-US" smtClean="0"/>
-              <a:t>2019/11/27</a:t>
+              <a:t>2023/9/21</a:t>
             </a:fld>
             <a:endParaRPr lang="zh-CN" altLang="en-US"/>
           </a:p>
@@ -5710,7 +5710,7 @@
           <a:p>
             <a:fld id="{16381544-E555-424B-A8A4-641E4ACFE059}" type="datetimeFigureOut">
               <a:rPr lang="zh-CN" altLang="en-US" smtClean="0"/>
-              <a:t>2019/11/27</a:t>
+              <a:t>2023/9/21</a:t>
             </a:fld>
             <a:endParaRPr lang="zh-CN" altLang="en-US"/>
           </a:p>
@@ -8837,11 +8837,11 @@
           <a:lstStyle/>
           <a:p>
             <a:r>
-              <a:rPr lang="zh-CN" altLang="en-US" b="1"/>
+              <a:rPr lang="zh-CN" altLang="en-US" b="1" dirty="0"/>
               <a:t>解法：</a:t>
             </a:r>
             <a:r>
-              <a:rPr lang="zh-CN" altLang="en-US" b="1">
+              <a:rPr lang="zh-CN" altLang="en-US" b="1" dirty="0">
                 <a:solidFill>
                   <a:srgbClr val="0000CC"/>
                 </a:solidFill>
@@ -8849,37 +8849,37 @@
               <a:t>贪心算法</a:t>
             </a:r>
             <a:r>
-              <a:rPr lang="zh-CN" altLang="en-US" b="1"/>
+              <a:rPr lang="zh-CN" altLang="en-US" b="1" dirty="0"/>
               <a:t>（时间复杂度</a:t>
             </a:r>
             <a:r>
-              <a:rPr lang="en-US" altLang="zh-CN" b="1"/>
+              <a:rPr lang="en-US" altLang="zh-CN" b="1" dirty="0"/>
               <a:t>O(n)</a:t>
             </a:r>
             <a:r>
-              <a:rPr lang="zh-CN" altLang="en-US" b="1"/>
+              <a:rPr lang="zh-CN" altLang="en-US" b="1" dirty="0"/>
               <a:t>，空间复杂度</a:t>
             </a:r>
             <a:r>
-              <a:rPr lang="en-US" altLang="zh-CN" b="1"/>
+              <a:rPr lang="en-US" altLang="zh-CN" b="1" dirty="0"/>
               <a:t>O(1)</a:t>
             </a:r>
             <a:r>
-              <a:rPr lang="zh-CN" altLang="en-US" b="1"/>
+              <a:rPr lang="zh-CN" altLang="en-US" b="1" dirty="0"/>
               <a:t>）</a:t>
             </a:r>
           </a:p>
           <a:p>
             <a:r>
-              <a:rPr lang="en-US" altLang="zh-CN" b="1"/>
+              <a:rPr lang="en-US" altLang="zh-CN" b="1" dirty="0"/>
               <a:t>0 </a:t>
             </a:r>
             <a:r>
-              <a:rPr lang="zh-CN" altLang="en-US" b="1"/>
+              <a:rPr lang="zh-CN" altLang="en-US" b="1" dirty="0"/>
               <a:t>如果数组</a:t>
             </a:r>
             <a:r>
-              <a:rPr lang="en-US" altLang="zh-CN" b="1">
+              <a:rPr lang="en-US" altLang="zh-CN" b="1" dirty="0" err="1">
                 <a:solidFill>
                   <a:srgbClr val="FF3399"/>
                 </a:solidFill>
@@ -8887,19 +8887,19 @@
               <a:t>nums</a:t>
             </a:r>
             <a:r>
-              <a:rPr lang="zh-CN" altLang="en-US" b="1"/>
+              <a:rPr lang="zh-CN" altLang="en-US" b="1" dirty="0"/>
               <a:t>为</a:t>
             </a:r>
             <a:r>
-              <a:rPr lang="en-US" altLang="zh-CN" b="1"/>
+              <a:rPr lang="en-US" altLang="zh-CN" b="1" dirty="0"/>
               <a:t>NULL</a:t>
             </a:r>
             <a:r>
-              <a:rPr lang="zh-CN" altLang="en-US" b="1"/>
+              <a:rPr lang="zh-CN" altLang="en-US" b="1" dirty="0"/>
               <a:t>或者空，则</a:t>
             </a:r>
             <a:r>
-              <a:rPr lang="zh-CN" altLang="en-US" b="1">
+              <a:rPr lang="zh-CN" altLang="en-US" b="1" dirty="0">
                 <a:solidFill>
                   <a:srgbClr val="FF9900"/>
                 </a:solidFill>
@@ -8907,21 +8907,21 @@
               <a:t>返回</a:t>
             </a:r>
             <a:r>
-              <a:rPr lang="en-US" altLang="zh-CN" b="1"/>
+              <a:rPr lang="en-US" altLang="zh-CN" b="1" dirty="0"/>
               <a:t>true</a:t>
             </a:r>
           </a:p>
           <a:p>
             <a:r>
-              <a:rPr lang="en-US" altLang="zh-CN" b="1"/>
+              <a:rPr lang="en-US" altLang="zh-CN" b="1" dirty="0"/>
               <a:t>1 </a:t>
             </a:r>
             <a:r>
-              <a:rPr lang="zh-CN" altLang="en-US" b="1"/>
+              <a:rPr lang="zh-CN" altLang="en-US" b="1" dirty="0"/>
               <a:t>初始化游标</a:t>
             </a:r>
             <a:r>
-              <a:rPr lang="en-US" altLang="zh-CN" b="1">
+              <a:rPr lang="en-US" altLang="zh-CN" b="1" dirty="0" err="1">
                 <a:solidFill>
                   <a:srgbClr val="6600FF"/>
                 </a:solidFill>
@@ -8929,19 +8929,19 @@
               <a:t>i</a:t>
             </a:r>
             <a:r>
-              <a:rPr lang="zh-CN" altLang="en-US" b="1"/>
+              <a:rPr lang="zh-CN" altLang="en-US" b="1" dirty="0"/>
               <a:t>为</a:t>
             </a:r>
             <a:r>
-              <a:rPr lang="en-US" altLang="zh-CN" b="1"/>
+              <a:rPr lang="en-US" altLang="zh-CN" b="1" dirty="0"/>
               <a:t>0</a:t>
             </a:r>
             <a:r>
-              <a:rPr lang="zh-CN" altLang="en-US" b="1"/>
+              <a:rPr lang="zh-CN" altLang="en-US" b="1" dirty="0"/>
               <a:t>、当前左侧好位置</a:t>
             </a:r>
             <a:r>
-              <a:rPr lang="en-US" altLang="zh-CN" b="1">
+              <a:rPr lang="en-US" altLang="zh-CN" b="1" dirty="0" err="1">
                 <a:solidFill>
                   <a:srgbClr val="CC00CC"/>
                 </a:solidFill>
@@ -8949,299 +8949,276 @@
               <a:t>goodPosition</a:t>
             </a:r>
             <a:r>
-              <a:rPr lang="zh-CN" altLang="en-US" b="1"/>
+              <a:rPr lang="zh-CN" altLang="en-US" b="1" dirty="0"/>
               <a:t>为</a:t>
             </a:r>
             <a:r>
-              <a:rPr lang="en-US" altLang="zh-CN" b="1"/>
+              <a:rPr lang="en-US" altLang="zh-CN" b="1" dirty="0" err="1">
+                <a:solidFill>
+                  <a:srgbClr val="008000"/>
+                </a:solidFill>
+              </a:rPr>
+              <a:t>nums.length</a:t>
+            </a:r>
+            <a:r>
+              <a:rPr lang="en-US" altLang="zh-CN" b="1" dirty="0">
+                <a:solidFill>
+                  <a:srgbClr val="008000"/>
+                </a:solidFill>
+              </a:rPr>
+              <a:t> - 1 </a:t>
+            </a:r>
+            <a:r>
+              <a:rPr lang="zh-CN" altLang="en-US" b="1" dirty="0"/>
+              <a:t>（好位置指的是，从该位置起，可以跳到下一个好位置或数组结尾；</a:t>
+            </a:r>
+            <a:r>
+              <a:rPr lang="zh-CN" altLang="en-US" b="1" dirty="0">
+                <a:solidFill>
+                  <a:srgbClr val="0000CC"/>
+                </a:solidFill>
+              </a:rPr>
+              <a:t>最后一个位置一定是好位置，因为它本身就在数组结尾</a:t>
+            </a:r>
+            <a:r>
+              <a:rPr lang="zh-CN" altLang="en-US" b="1" dirty="0"/>
+              <a:t>）</a:t>
+            </a:r>
+          </a:p>
+          <a:p>
+            <a:r>
+              <a:rPr lang="en-US" altLang="zh-CN" b="1" dirty="0"/>
+              <a:t>2 </a:t>
+            </a:r>
+            <a:r>
+              <a:rPr lang="zh-CN" altLang="en-US" b="1" dirty="0"/>
+              <a:t>倒序遍历</a:t>
+            </a:r>
+            <a:r>
+              <a:rPr lang="en-US" altLang="zh-CN" b="1" dirty="0" err="1">
+                <a:solidFill>
+                  <a:srgbClr val="FF3399"/>
+                </a:solidFill>
+              </a:rPr>
+              <a:t>nums</a:t>
+            </a:r>
+            <a:r>
+              <a:rPr lang="zh-CN" altLang="en-US" b="1" dirty="0"/>
+              <a:t>数组（</a:t>
+            </a:r>
+            <a:r>
+              <a:rPr lang="zh-CN" altLang="en-US" b="1" dirty="0">
+                <a:solidFill>
+                  <a:srgbClr val="008000"/>
+                </a:solidFill>
+              </a:rPr>
+              <a:t>从</a:t>
+            </a:r>
+            <a:r>
+              <a:rPr lang="en-US" altLang="zh-CN" b="1" dirty="0" err="1">
+                <a:solidFill>
+                  <a:srgbClr val="008000"/>
+                </a:solidFill>
+              </a:rPr>
+              <a:t>nums.length</a:t>
+            </a:r>
+            <a:r>
+              <a:rPr lang="en-US" altLang="zh-CN" b="1" dirty="0">
+                <a:solidFill>
+                  <a:srgbClr val="008000"/>
+                </a:solidFill>
+              </a:rPr>
+              <a:t> - 2</a:t>
+            </a:r>
+            <a:r>
+              <a:rPr lang="zh-CN" altLang="en-US" b="1" dirty="0">
+                <a:solidFill>
+                  <a:srgbClr val="008000"/>
+                </a:solidFill>
+              </a:rPr>
+              <a:t>开始倒序遍历</a:t>
+            </a:r>
+            <a:r>
+              <a:rPr lang="zh-CN" altLang="en-US" b="1" dirty="0"/>
+              <a:t>），依次执行如下操作</a:t>
+            </a:r>
+          </a:p>
+          <a:p>
+            <a:r>
+              <a:rPr lang="zh-CN" altLang="en-US" b="1" dirty="0"/>
+              <a:t>  </a:t>
+            </a:r>
+            <a:r>
+              <a:rPr lang="en-US" altLang="zh-CN" b="1" dirty="0"/>
+              <a:t>2.1 </a:t>
+            </a:r>
+            <a:r>
+              <a:rPr lang="zh-CN" altLang="en-US" b="1" dirty="0"/>
+              <a:t>判断游标</a:t>
+            </a:r>
+            <a:r>
+              <a:rPr lang="en-US" altLang="zh-CN" b="1" dirty="0" err="1">
+                <a:solidFill>
+                  <a:srgbClr val="6600FF"/>
+                </a:solidFill>
+              </a:rPr>
+              <a:t>i</a:t>
+            </a:r>
+            <a:r>
+              <a:rPr lang="en-US" altLang="zh-CN" b="1" dirty="0"/>
+              <a:t> + </a:t>
+            </a:r>
+            <a:r>
+              <a:rPr lang="en-US" altLang="zh-CN" b="1" dirty="0" err="1">
+                <a:solidFill>
+                  <a:srgbClr val="FF3399"/>
+                </a:solidFill>
+              </a:rPr>
+              <a:t>nums</a:t>
+            </a:r>
+            <a:r>
+              <a:rPr lang="en-US" altLang="zh-CN" b="1" dirty="0"/>
+              <a:t>[</a:t>
+            </a:r>
+            <a:r>
+              <a:rPr lang="en-US" altLang="zh-CN" b="1" dirty="0" err="1">
+                <a:solidFill>
+                  <a:srgbClr val="6600FF"/>
+                </a:solidFill>
+              </a:rPr>
+              <a:t>i</a:t>
+            </a:r>
+            <a:r>
+              <a:rPr lang="en-US" altLang="zh-CN" b="1" dirty="0"/>
+              <a:t>]</a:t>
+            </a:r>
+            <a:r>
+              <a:rPr lang="zh-CN" altLang="en-US" b="1" dirty="0"/>
+              <a:t>的值是否大于等于</a:t>
+            </a:r>
+            <a:r>
+              <a:rPr lang="en-US" altLang="zh-CN" b="1" dirty="0" err="1">
+                <a:solidFill>
+                  <a:srgbClr val="CC00CC"/>
+                </a:solidFill>
+              </a:rPr>
+              <a:t>goodPosition</a:t>
+            </a:r>
+            <a:endParaRPr lang="en-US" altLang="zh-CN" b="1" dirty="0">
+              <a:solidFill>
+                <a:srgbClr val="CC00CC"/>
+              </a:solidFill>
+            </a:endParaRPr>
+          </a:p>
+          <a:p>
+            <a:r>
+              <a:rPr lang="en-US" altLang="zh-CN" b="1" dirty="0"/>
+              <a:t>    2.1.1 </a:t>
+            </a:r>
+            <a:r>
+              <a:rPr lang="zh-CN" altLang="en-US" b="1" dirty="0"/>
+              <a:t>是的话，将</a:t>
+            </a:r>
+            <a:r>
+              <a:rPr lang="en-US" altLang="zh-CN" b="1" dirty="0" err="1">
+                <a:solidFill>
+                  <a:srgbClr val="6600FF"/>
+                </a:solidFill>
+              </a:rPr>
+              <a:t>i</a:t>
+            </a:r>
+            <a:r>
+              <a:rPr lang="zh-CN" altLang="en-US" b="1" dirty="0"/>
+              <a:t>赋值给</a:t>
+            </a:r>
+            <a:r>
+              <a:rPr lang="en-US" altLang="zh-CN" b="1" dirty="0" err="1">
+                <a:solidFill>
+                  <a:srgbClr val="CC00CC"/>
+                </a:solidFill>
+              </a:rPr>
+              <a:t>goodPosition</a:t>
+            </a:r>
+            <a:r>
+              <a:rPr lang="zh-CN" altLang="en-US" b="1" dirty="0"/>
+              <a:t>（</a:t>
+            </a:r>
+            <a:r>
+              <a:rPr lang="zh-CN" altLang="en-US" b="1" dirty="0">
+                <a:solidFill>
+                  <a:srgbClr val="CC6600"/>
+                </a:solidFill>
+              </a:rPr>
+              <a:t>贪心策略</a:t>
+            </a:r>
+            <a:r>
+              <a:rPr lang="zh-CN" altLang="en-US" b="1" dirty="0"/>
+              <a:t>：</a:t>
+            </a:r>
+            <a:r>
+              <a:rPr lang="zh-CN" altLang="en-US" b="1" dirty="0">
+                <a:solidFill>
+                  <a:srgbClr val="0000CC"/>
+                </a:solidFill>
+              </a:rPr>
+              <a:t>从后往前不断寻找好位置，直到最终的好位置位于或接近数组开头。</a:t>
+            </a:r>
+            <a:r>
+              <a:rPr lang="zh-CN" altLang="en-US" b="1" dirty="0"/>
+              <a:t>）</a:t>
+            </a:r>
+          </a:p>
+          <a:p>
+            <a:r>
+              <a:rPr lang="zh-CN" altLang="en-US" b="1" dirty="0"/>
+              <a:t>    </a:t>
+            </a:r>
+            <a:r>
+              <a:rPr lang="en-US" altLang="zh-CN" b="1" dirty="0"/>
+              <a:t>2.1.2 </a:t>
+            </a:r>
+            <a:r>
+              <a:rPr lang="zh-CN" altLang="en-US" b="1" dirty="0"/>
+              <a:t>否的话，不执行任何操作</a:t>
+            </a:r>
+          </a:p>
+          <a:p>
+            <a:r>
+              <a:rPr lang="en-US" altLang="zh-CN" b="1" dirty="0"/>
+              <a:t>3 </a:t>
+            </a:r>
+            <a:r>
+              <a:rPr lang="zh-CN" altLang="en-US" b="1" dirty="0"/>
+              <a:t>判断</a:t>
+            </a:r>
+            <a:r>
+              <a:rPr lang="en-US" altLang="zh-CN" b="1" dirty="0" err="1">
+                <a:solidFill>
+                  <a:srgbClr val="CC00CC"/>
+                </a:solidFill>
+              </a:rPr>
+              <a:t>goodPosition</a:t>
+            </a:r>
+            <a:r>
+              <a:rPr lang="zh-CN" altLang="en-US" b="1" dirty="0"/>
+              <a:t>是否为</a:t>
+            </a:r>
+            <a:r>
+              <a:rPr lang="en-US" altLang="zh-CN" b="1" dirty="0"/>
               <a:t>0</a:t>
             </a:r>
-            <a:r>
-              <a:rPr lang="zh-CN" altLang="en-US" b="1"/>
-              <a:t>（好位置指的是，从该位置起，可以跳到下一个好位置或数组结尾）</a:t>
-            </a:r>
-          </a:p>
-          <a:p>
-            <a:r>
-              <a:rPr lang="en-US" altLang="zh-CN" b="1"/>
-              <a:t>2 </a:t>
-            </a:r>
-            <a:r>
-              <a:rPr lang="zh-CN" altLang="en-US" b="1"/>
-              <a:t>倒序遍历</a:t>
-            </a:r>
-            <a:r>
-              <a:rPr lang="en-US" altLang="zh-CN" b="1">
-                <a:solidFill>
-                  <a:srgbClr val="FF3399"/>
-                </a:solidFill>
-              </a:rPr>
-              <a:t>nums</a:t>
-            </a:r>
-            <a:r>
-              <a:rPr lang="zh-CN" altLang="en-US" b="1"/>
-              <a:t>数组，依次执行如下操作</a:t>
-            </a:r>
-          </a:p>
-          <a:p>
-            <a:r>
-              <a:rPr lang="zh-CN" altLang="en-US" b="1"/>
-              <a:t>  </a:t>
-            </a:r>
-            <a:r>
-              <a:rPr lang="en-US" altLang="zh-CN" b="1"/>
-              <a:t>2.1 </a:t>
-            </a:r>
-            <a:r>
-              <a:rPr lang="zh-CN" altLang="en-US" b="1"/>
-              <a:t>判断游标</a:t>
-            </a:r>
-            <a:r>
-              <a:rPr lang="en-US" altLang="zh-CN" b="1">
-                <a:solidFill>
-                  <a:srgbClr val="6600FF"/>
-                </a:solidFill>
-              </a:rPr>
-              <a:t>i</a:t>
-            </a:r>
-            <a:r>
-              <a:rPr lang="en-US" altLang="zh-CN" b="1"/>
-              <a:t> + </a:t>
-            </a:r>
-            <a:r>
-              <a:rPr lang="en-US" altLang="zh-CN" b="1">
-                <a:solidFill>
-                  <a:srgbClr val="FF3399"/>
-                </a:solidFill>
-              </a:rPr>
-              <a:t>nums</a:t>
-            </a:r>
-            <a:r>
-              <a:rPr lang="en-US" altLang="zh-CN" b="1"/>
-              <a:t>[</a:t>
-            </a:r>
-            <a:r>
-              <a:rPr lang="en-US" altLang="zh-CN" b="1">
-                <a:solidFill>
-                  <a:srgbClr val="6600FF"/>
-                </a:solidFill>
-              </a:rPr>
-              <a:t>i</a:t>
-            </a:r>
-            <a:r>
-              <a:rPr lang="en-US" altLang="zh-CN" b="1"/>
-              <a:t>]</a:t>
-            </a:r>
-            <a:r>
-              <a:rPr lang="zh-CN" altLang="en-US" b="1"/>
-              <a:t>的值是否大于等于</a:t>
-            </a:r>
-            <a:r>
-              <a:rPr lang="en-US" altLang="zh-CN" b="1">
-                <a:solidFill>
-                  <a:srgbClr val="CC00CC"/>
-                </a:solidFill>
-              </a:rPr>
-              <a:t>goodPosition</a:t>
-            </a:r>
-          </a:p>
-          <a:p>
-            <a:r>
-              <a:rPr lang="en-US" altLang="zh-CN" b="1"/>
-              <a:t>    2.1.1 </a:t>
-            </a:r>
-            <a:r>
-              <a:rPr lang="zh-CN" altLang="en-US" b="1"/>
-              <a:t>是的话，将</a:t>
-            </a:r>
-            <a:r>
-              <a:rPr lang="en-US" altLang="zh-CN" b="1">
-                <a:solidFill>
-                  <a:srgbClr val="6600FF"/>
-                </a:solidFill>
-              </a:rPr>
-              <a:t>i</a:t>
-            </a:r>
-            <a:r>
-              <a:rPr lang="zh-CN" altLang="en-US" b="1"/>
-              <a:t>赋值给</a:t>
-            </a:r>
-            <a:r>
-              <a:rPr lang="en-US" altLang="zh-CN" b="1">
-                <a:solidFill>
-                  <a:srgbClr val="CC00CC"/>
-                </a:solidFill>
-              </a:rPr>
-              <a:t>goodPosition</a:t>
-            </a:r>
-            <a:r>
-              <a:rPr lang="zh-CN" altLang="en-US" b="1"/>
-              <a:t>（</a:t>
-            </a:r>
-            <a:r>
-              <a:rPr lang="zh-CN" altLang="en-US" b="1">
-                <a:solidFill>
-                  <a:srgbClr val="CC6600"/>
-                </a:solidFill>
-              </a:rPr>
-              <a:t>贪心策略</a:t>
-            </a:r>
-            <a:r>
-              <a:rPr lang="zh-CN" altLang="en-US" b="1"/>
-              <a:t>：</a:t>
-            </a:r>
-            <a:r>
-              <a:rPr lang="zh-CN" altLang="en-US" b="1">
-                <a:solidFill>
-                  <a:srgbClr val="0000CC"/>
-                </a:solidFill>
-              </a:rPr>
-              <a:t>从后往前不断寻找好位置，直到最终的好位置位于或接近数组开头。最后一个位置一定是好位置，因为它本身就在数组结尾</a:t>
-            </a:r>
-            <a:r>
-              <a:rPr lang="en-US" altLang="zh-CN" b="1">
-                <a:solidFill>
-                  <a:srgbClr val="0000CC"/>
-                </a:solidFill>
-              </a:rPr>
-              <a:t>[</a:t>
-            </a:r>
-            <a:r>
-              <a:rPr lang="zh-CN" altLang="en-US" b="1">
-                <a:solidFill>
-                  <a:srgbClr val="008000"/>
-                </a:solidFill>
-              </a:rPr>
-              <a:t>所以，可以</a:t>
-            </a:r>
-            <a:r>
-              <a:rPr lang="en-US" altLang="zh-CN" b="1">
-                <a:solidFill>
-                  <a:srgbClr val="008000"/>
-                </a:solidFill>
-              </a:rPr>
-              <a:t>goodPosition</a:t>
-            </a:r>
-            <a:r>
-              <a:rPr lang="zh-CN" altLang="en-US" b="1">
-                <a:solidFill>
-                  <a:srgbClr val="008000"/>
-                </a:solidFill>
-              </a:rPr>
-              <a:t>初始值赋值为</a:t>
-            </a:r>
-            <a:r>
-              <a:rPr lang="en-US" altLang="zh-CN" b="1">
-                <a:solidFill>
-                  <a:srgbClr val="008000"/>
-                </a:solidFill>
-              </a:rPr>
-              <a:t>nums.length - 1</a:t>
-            </a:r>
-            <a:r>
-              <a:rPr lang="zh-CN" altLang="en-US" b="1">
-                <a:solidFill>
-                  <a:srgbClr val="008000"/>
-                </a:solidFill>
-              </a:rPr>
-              <a:t>，</a:t>
-            </a:r>
-            <a:r>
-              <a:rPr lang="en-US" altLang="zh-CN" b="1">
-                <a:solidFill>
-                  <a:srgbClr val="008000"/>
-                </a:solidFill>
-              </a:rPr>
-              <a:t>i</a:t>
-            </a:r>
-            <a:r>
-              <a:rPr lang="zh-CN" altLang="en-US" b="1">
-                <a:solidFill>
-                  <a:srgbClr val="008000"/>
-                </a:solidFill>
-              </a:rPr>
-              <a:t>从</a:t>
-            </a:r>
-            <a:r>
-              <a:rPr lang="en-US" altLang="zh-CN" b="1">
-                <a:solidFill>
-                  <a:srgbClr val="008000"/>
-                </a:solidFill>
-              </a:rPr>
-              <a:t>nums.length - 2</a:t>
-            </a:r>
-            <a:r>
-              <a:rPr lang="zh-CN" altLang="en-US" b="1">
-                <a:solidFill>
-                  <a:srgbClr val="008000"/>
-                </a:solidFill>
-              </a:rPr>
-              <a:t>开始倒序遍历</a:t>
-            </a:r>
-            <a:r>
-              <a:rPr lang="en-US" altLang="zh-CN" b="1">
-                <a:solidFill>
-                  <a:srgbClr val="0000CC"/>
-                </a:solidFill>
-              </a:rPr>
-              <a:t>]</a:t>
-            </a:r>
-            <a:r>
-              <a:rPr lang="zh-CN" altLang="en-US" b="1"/>
-              <a:t>）</a:t>
-            </a:r>
-          </a:p>
-          <a:p>
-            <a:r>
-              <a:rPr lang="zh-CN" altLang="en-US" b="1"/>
-              <a:t>    </a:t>
-            </a:r>
-            <a:r>
-              <a:rPr lang="en-US" altLang="zh-CN" b="1"/>
-              <a:t>2.1.2 </a:t>
-            </a:r>
-            <a:r>
-              <a:rPr lang="zh-CN" altLang="en-US" b="1"/>
-              <a:t>否的话，不执行任何操作</a:t>
-            </a:r>
-          </a:p>
-          <a:p>
-            <a:r>
-              <a:rPr lang="en-US" altLang="zh-CN" b="1"/>
-              <a:t>3 </a:t>
-            </a:r>
-            <a:r>
-              <a:rPr lang="zh-CN" altLang="en-US" b="1"/>
-              <a:t>判断</a:t>
-            </a:r>
-            <a:r>
-              <a:rPr lang="en-US" altLang="zh-CN" b="1">
-                <a:solidFill>
-                  <a:srgbClr val="CC00CC"/>
-                </a:solidFill>
-              </a:rPr>
-              <a:t>goodPosition</a:t>
-            </a:r>
-            <a:r>
-              <a:rPr lang="zh-CN" altLang="en-US" b="1"/>
-              <a:t>是否为</a:t>
-            </a:r>
-            <a:r>
-              <a:rPr lang="en-US" altLang="zh-CN" b="1"/>
-              <a:t>0</a:t>
-            </a:r>
-          </a:p>
-          <a:p>
-            <a:r>
-              <a:rPr lang="en-US" altLang="zh-CN" b="1"/>
+          </a:p>
+          <a:p>
+            <a:r>
+              <a:rPr lang="en-US" altLang="zh-CN" b="1" dirty="0"/>
               <a:t>  3.1 </a:t>
             </a:r>
             <a:r>
-              <a:rPr lang="zh-CN" altLang="en-US" b="1"/>
+              <a:rPr lang="zh-CN" altLang="en-US" b="1" dirty="0"/>
               <a:t>是的话，</a:t>
             </a:r>
             <a:r>
-              <a:rPr lang="zh-CN" altLang="en-US" b="1">
+              <a:rPr lang="zh-CN" altLang="en-US" b="1" dirty="0">
                 <a:solidFill>
                   <a:srgbClr val="FF9900"/>
                 </a:solidFill>
@@ -9249,21 +9226,21 @@
               <a:t>返回</a:t>
             </a:r>
             <a:r>
-              <a:rPr lang="en-US" altLang="zh-CN" b="1"/>
+              <a:rPr lang="en-US" altLang="zh-CN" b="1" dirty="0"/>
               <a:t>true</a:t>
             </a:r>
           </a:p>
           <a:p>
             <a:r>
-              <a:rPr lang="en-US" altLang="zh-CN" b="1"/>
+              <a:rPr lang="en-US" altLang="zh-CN" b="1" dirty="0"/>
               <a:t>  3.2 </a:t>
             </a:r>
             <a:r>
-              <a:rPr lang="zh-CN" altLang="en-US" b="1"/>
+              <a:rPr lang="zh-CN" altLang="en-US" b="1" dirty="0"/>
               <a:t>否的话，</a:t>
             </a:r>
             <a:r>
-              <a:rPr lang="zh-CN" altLang="en-US" b="1">
+              <a:rPr lang="zh-CN" altLang="en-US" b="1" dirty="0">
                 <a:solidFill>
                   <a:srgbClr val="FF9900"/>
                 </a:solidFill>
@@ -9271,7 +9248,7 @@
               <a:t>返回</a:t>
             </a:r>
             <a:r>
-              <a:rPr lang="en-US" altLang="zh-CN" b="1"/>
+              <a:rPr lang="en-US" altLang="zh-CN" b="1" dirty="0"/>
               <a:t>false</a:t>
             </a:r>
           </a:p>
@@ -9279,10 +9256,10 @@
       </p:sp>
       <p:pic>
         <p:nvPicPr>
-          <p:cNvPr id="5" name="图片 4">
+          <p:cNvPr id="7" name="图片 6">
             <a:extLst>
               <a:ext uri="{FF2B5EF4-FFF2-40B4-BE49-F238E27FC236}">
-                <a16:creationId xmlns:a16="http://schemas.microsoft.com/office/drawing/2014/main" id="{9B5019FE-7A09-48A1-82CC-E20492D3380D}"/>
+                <a16:creationId xmlns:a16="http://schemas.microsoft.com/office/drawing/2014/main" id="{15B28B60-23EA-9D72-3F01-EB1BA6588A07}"/>
               </a:ext>
             </a:extLst>
           </p:cNvPr>
@@ -9292,15 +9269,21 @@
           <p:nvPr/>
         </p:nvPicPr>
         <p:blipFill>
-          <a:blip r:embed="rId2"/>
+          <a:blip r:embed="rId2">
+            <a:extLst>
+              <a:ext uri="{28A0092B-C50C-407E-A947-70E740481C1C}">
+                <a14:useLocalDpi xmlns:a14="http://schemas.microsoft.com/office/drawing/2010/main" val="0"/>
+              </a:ext>
+            </a:extLst>
+          </a:blip>
           <a:stretch>
             <a:fillRect/>
           </a:stretch>
         </p:blipFill>
         <p:spPr>
           <a:xfrm>
-            <a:off x="6096000" y="708445"/>
-            <a:ext cx="5864583" cy="5275385"/>
+            <a:off x="5903421" y="1002553"/>
+            <a:ext cx="5987015" cy="4667602"/>
           </a:xfrm>
           <a:prstGeom prst="rect">
             <a:avLst/>

</xml_diff>